<commit_message>
DotNet Bangalore May 2024: Sound Classification using ML.Net Updated Readme
</commit_message>
<xml_diff>
--- a/11052024-Sound-Classification-ML.Net-dotnetblr/SoundClassification-dotnetblr.pptx
+++ b/11052024-Sound-Classification-ML.Net-dotnetblr/SoundClassification-dotnetblr.pptx
@@ -5,7 +5,7 @@
     <p:sldMasterId id="2147483648" r:id="rId1"/>
   </p:sldMasterIdLst>
   <p:notesMasterIdLst>
-    <p:notesMasterId r:id="rId13"/>
+    <p:notesMasterId r:id="rId12"/>
   </p:notesMasterIdLst>
   <p:sldIdLst>
     <p:sldId id="256" r:id="rId2"/>
@@ -15,10 +15,9 @@
     <p:sldId id="391" r:id="rId6"/>
     <p:sldId id="390" r:id="rId7"/>
     <p:sldId id="392" r:id="rId8"/>
-    <p:sldId id="388" r:id="rId9"/>
-    <p:sldId id="389" r:id="rId10"/>
-    <p:sldId id="324" r:id="rId11"/>
-    <p:sldId id="325" r:id="rId12"/>
+    <p:sldId id="389" r:id="rId9"/>
+    <p:sldId id="324" r:id="rId10"/>
+    <p:sldId id="325" r:id="rId11"/>
   </p:sldIdLst>
   <p:sldSz cx="12192000" cy="6858000"/>
   <p:notesSz cx="6858000" cy="9144000"/>
@@ -707,7 +706,7 @@
           <a:p>
             <a:fld id="{55849CEA-452E-49F3-92ED-210B64DD3C6C}" type="slidenum">
               <a:rPr lang="en-US" smtClean="0"/>
-              <a:t>10</a:t>
+              <a:t>9</a:t>
             </a:fld>
             <a:endParaRPr lang="en-US" dirty="0"/>
           </a:p>
@@ -791,7 +790,7 @@
           <a:p>
             <a:fld id="{55849CEA-452E-49F3-92ED-210B64DD3C6C}" type="slidenum">
               <a:rPr lang="en-US" smtClean="0"/>
-              <a:t>11</a:t>
+              <a:t>10</a:t>
             </a:fld>
             <a:endParaRPr lang="en-US" dirty="0"/>
           </a:p>
@@ -4906,610 +4905,6 @@
 <file path=ppt/slides/slide10.xml><?xml version="1.0" encoding="utf-8"?>
 <p:sld xmlns:a="http://schemas.openxmlformats.org/drawingml/2006/main" xmlns:r="http://schemas.openxmlformats.org/officeDocument/2006/relationships" xmlns:p="http://schemas.openxmlformats.org/presentationml/2006/main">
   <p:cSld>
-    <p:bg>
-      <p:bgPr>
-        <a:solidFill>
-          <a:schemeClr val="bg1"/>
-        </a:solidFill>
-        <a:effectLst/>
-      </p:bgPr>
-    </p:bg>
-    <p:spTree>
-      <p:nvGrpSpPr>
-        <p:cNvPr id="1" name=""/>
-        <p:cNvGrpSpPr/>
-        <p:nvPr/>
-      </p:nvGrpSpPr>
-      <p:grpSpPr>
-        <a:xfrm>
-          <a:off x="0" y="0"/>
-          <a:ext cx="0" cy="0"/>
-          <a:chOff x="0" y="0"/>
-          <a:chExt cx="0" cy="0"/>
-        </a:xfrm>
-      </p:grpSpPr>
-      <p:sp useBgFill="1">
-        <p:nvSpPr>
-          <p:cNvPr id="10" name="Rectangle 9">
-            <a:extLst>
-              <a:ext uri="{FF2B5EF4-FFF2-40B4-BE49-F238E27FC236}">
-                <a16:creationId xmlns:a16="http://schemas.microsoft.com/office/drawing/2014/main" id="{777A147A-9ED8-46B4-8660-1B3C2AA880B5}"/>
-              </a:ext>
-              <a:ext uri="{C183D7F6-B498-43B3-948B-1728B52AA6E4}">
-                <adec:decorative xmlns:adec="http://schemas.microsoft.com/office/drawing/2017/decorative" val="1"/>
-              </a:ext>
-            </a:extLst>
-          </p:cNvPr>
-          <p:cNvSpPr>
-            <a:spLocks noGrp="1" noRot="1" noChangeAspect="1" noMove="1" noResize="1" noEditPoints="1" noAdjustHandles="1" noChangeArrowheads="1" noChangeShapeType="1" noTextEdit="1"/>
-          </p:cNvSpPr>
-          <p:nvPr>
-            <p:extLst>
-              <p:ext uri="{386F3935-93C4-4BCD-93E2-E3B085C9AB24}">
-                <p16:designElem xmlns:p16="http://schemas.microsoft.com/office/powerpoint/2015/main" val="1"/>
-              </p:ext>
-            </p:extLst>
-          </p:nvPr>
-        </p:nvSpPr>
-        <p:spPr>
-          <a:xfrm>
-            <a:off x="0" y="0"/>
-            <a:ext cx="12188952" cy="6858000"/>
-          </a:xfrm>
-          <a:prstGeom prst="rect">
-            <a:avLst/>
-          </a:prstGeom>
-          <a:ln>
-            <a:noFill/>
-          </a:ln>
-        </p:spPr>
-        <p:style>
-          <a:lnRef idx="2">
-            <a:schemeClr val="accent1">
-              <a:shade val="50000"/>
-            </a:schemeClr>
-          </a:lnRef>
-          <a:fillRef idx="1">
-            <a:schemeClr val="accent1"/>
-          </a:fillRef>
-          <a:effectRef idx="0">
-            <a:schemeClr val="accent1"/>
-          </a:effectRef>
-          <a:fontRef idx="minor">
-            <a:schemeClr val="lt1"/>
-          </a:fontRef>
-        </p:style>
-        <p:txBody>
-          <a:bodyPr rtlCol="0" anchor="ctr"/>
-          <a:lstStyle/>
-          <a:p>
-            <a:pPr algn="ctr"/>
-            <a:endParaRPr lang="en-US"/>
-          </a:p>
-        </p:txBody>
-      </p:sp>
-      <p:sp>
-        <p:nvSpPr>
-          <p:cNvPr id="2" name="Title 1"/>
-          <p:cNvSpPr>
-            <a:spLocks noGrp="1"/>
-          </p:cNvSpPr>
-          <p:nvPr>
-            <p:ph type="title"/>
-          </p:nvPr>
-        </p:nvSpPr>
-        <p:spPr>
-          <a:xfrm>
-            <a:off x="841248" y="548640"/>
-            <a:ext cx="3600860" cy="5431536"/>
-          </a:xfrm>
-        </p:spPr>
-        <p:txBody>
-          <a:bodyPr>
-            <a:normAutofit/>
-          </a:bodyPr>
-          <a:lstStyle/>
-          <a:p>
-            <a:r>
-              <a:rPr lang="en-US" sz="5400"/>
-              <a:t>Resources</a:t>
-            </a:r>
-          </a:p>
-        </p:txBody>
-      </p:sp>
-      <p:sp>
-        <p:nvSpPr>
-          <p:cNvPr id="12" name="sketch line">
-            <a:extLst>
-              <a:ext uri="{FF2B5EF4-FFF2-40B4-BE49-F238E27FC236}">
-                <a16:creationId xmlns:a16="http://schemas.microsoft.com/office/drawing/2014/main" id="{5D6C15A0-C087-4593-8414-2B4EC1CDC3DE}"/>
-              </a:ext>
-              <a:ext uri="{C183D7F6-B498-43B3-948B-1728B52AA6E4}">
-                <adec:decorative xmlns:adec="http://schemas.microsoft.com/office/drawing/2017/decorative" val="1"/>
-              </a:ext>
-            </a:extLst>
-          </p:cNvPr>
-          <p:cNvSpPr>
-            <a:spLocks noGrp="1" noRot="1" noChangeAspect="1" noMove="1" noResize="1" noEditPoints="1" noAdjustHandles="1" noChangeArrowheads="1" noChangeShapeType="1" noTextEdit="1"/>
-          </p:cNvSpPr>
-          <p:nvPr>
-            <p:extLst>
-              <p:ext uri="{386F3935-93C4-4BCD-93E2-E3B085C9AB24}">
-                <p16:designElem xmlns:p16="http://schemas.microsoft.com/office/powerpoint/2015/main" val="1"/>
-              </p:ext>
-            </p:extLst>
-          </p:nvPr>
-        </p:nvSpPr>
-        <p:spPr>
-          <a:xfrm rot="5400000">
-            <a:off x="2543983" y="3258715"/>
-            <a:ext cx="4480560" cy="18288"/>
-          </a:xfrm>
-          <a:custGeom>
-            <a:avLst/>
-            <a:gdLst>
-              <a:gd name="connsiteX0" fmla="*/ 0 w 4480560"/>
-              <a:gd name="connsiteY0" fmla="*/ 0 h 18288"/>
-              <a:gd name="connsiteX1" fmla="*/ 595274 w 4480560"/>
-              <a:gd name="connsiteY1" fmla="*/ 0 h 18288"/>
-              <a:gd name="connsiteX2" fmla="*/ 1100938 w 4480560"/>
-              <a:gd name="connsiteY2" fmla="*/ 0 h 18288"/>
-              <a:gd name="connsiteX3" fmla="*/ 1651406 w 4480560"/>
-              <a:gd name="connsiteY3" fmla="*/ 0 h 18288"/>
-              <a:gd name="connsiteX4" fmla="*/ 2336292 w 4480560"/>
-              <a:gd name="connsiteY4" fmla="*/ 0 h 18288"/>
-              <a:gd name="connsiteX5" fmla="*/ 2931566 w 4480560"/>
-              <a:gd name="connsiteY5" fmla="*/ 0 h 18288"/>
-              <a:gd name="connsiteX6" fmla="*/ 3482035 w 4480560"/>
-              <a:gd name="connsiteY6" fmla="*/ 0 h 18288"/>
-              <a:gd name="connsiteX7" fmla="*/ 4480560 w 4480560"/>
-              <a:gd name="connsiteY7" fmla="*/ 0 h 18288"/>
-              <a:gd name="connsiteX8" fmla="*/ 4480560 w 4480560"/>
-              <a:gd name="connsiteY8" fmla="*/ 18288 h 18288"/>
-              <a:gd name="connsiteX9" fmla="*/ 3840480 w 4480560"/>
-              <a:gd name="connsiteY9" fmla="*/ 18288 h 18288"/>
-              <a:gd name="connsiteX10" fmla="*/ 3290011 w 4480560"/>
-              <a:gd name="connsiteY10" fmla="*/ 18288 h 18288"/>
-              <a:gd name="connsiteX11" fmla="*/ 2560320 w 4480560"/>
-              <a:gd name="connsiteY11" fmla="*/ 18288 h 18288"/>
-              <a:gd name="connsiteX12" fmla="*/ 1965046 w 4480560"/>
-              <a:gd name="connsiteY12" fmla="*/ 18288 h 18288"/>
-              <a:gd name="connsiteX13" fmla="*/ 1459382 w 4480560"/>
-              <a:gd name="connsiteY13" fmla="*/ 18288 h 18288"/>
-              <a:gd name="connsiteX14" fmla="*/ 774497 w 4480560"/>
-              <a:gd name="connsiteY14" fmla="*/ 18288 h 18288"/>
-              <a:gd name="connsiteX15" fmla="*/ 0 w 4480560"/>
-              <a:gd name="connsiteY15" fmla="*/ 18288 h 18288"/>
-              <a:gd name="connsiteX16" fmla="*/ 0 w 4480560"/>
-              <a:gd name="connsiteY16" fmla="*/ 0 h 18288"/>
-            </a:gdLst>
-            <a:ahLst/>
-            <a:cxnLst>
-              <a:cxn ang="0">
-                <a:pos x="connsiteX0" y="connsiteY0"/>
-              </a:cxn>
-              <a:cxn ang="0">
-                <a:pos x="connsiteX1" y="connsiteY1"/>
-              </a:cxn>
-              <a:cxn ang="0">
-                <a:pos x="connsiteX2" y="connsiteY2"/>
-              </a:cxn>
-              <a:cxn ang="0">
-                <a:pos x="connsiteX3" y="connsiteY3"/>
-              </a:cxn>
-              <a:cxn ang="0">
-                <a:pos x="connsiteX4" y="connsiteY4"/>
-              </a:cxn>
-              <a:cxn ang="0">
-                <a:pos x="connsiteX5" y="connsiteY5"/>
-              </a:cxn>
-              <a:cxn ang="0">
-                <a:pos x="connsiteX6" y="connsiteY6"/>
-              </a:cxn>
-              <a:cxn ang="0">
-                <a:pos x="connsiteX7" y="connsiteY7"/>
-              </a:cxn>
-              <a:cxn ang="0">
-                <a:pos x="connsiteX8" y="connsiteY8"/>
-              </a:cxn>
-              <a:cxn ang="0">
-                <a:pos x="connsiteX9" y="connsiteY9"/>
-              </a:cxn>
-              <a:cxn ang="0">
-                <a:pos x="connsiteX10" y="connsiteY10"/>
-              </a:cxn>
-              <a:cxn ang="0">
-                <a:pos x="connsiteX11" y="connsiteY11"/>
-              </a:cxn>
-              <a:cxn ang="0">
-                <a:pos x="connsiteX12" y="connsiteY12"/>
-              </a:cxn>
-              <a:cxn ang="0">
-                <a:pos x="connsiteX13" y="connsiteY13"/>
-              </a:cxn>
-              <a:cxn ang="0">
-                <a:pos x="connsiteX14" y="connsiteY14"/>
-              </a:cxn>
-              <a:cxn ang="0">
-                <a:pos x="connsiteX15" y="connsiteY15"/>
-              </a:cxn>
-              <a:cxn ang="0">
-                <a:pos x="connsiteX16" y="connsiteY16"/>
-              </a:cxn>
-            </a:cxnLst>
-            <a:rect l="l" t="t" r="r" b="b"/>
-            <a:pathLst>
-              <a:path w="4480560" h="18288" fill="none" extrusionOk="0">
-                <a:moveTo>
-                  <a:pt x="0" y="0"/>
-                </a:moveTo>
-                <a:cubicBezTo>
-                  <a:pt x="267821" y="8731"/>
-                  <a:pt x="334105" y="2629"/>
-                  <a:pt x="595274" y="0"/>
-                </a:cubicBezTo>
-                <a:cubicBezTo>
-                  <a:pt x="856443" y="-2629"/>
-                  <a:pt x="863808" y="-13353"/>
-                  <a:pt x="1100938" y="0"/>
-                </a:cubicBezTo>
-                <a:cubicBezTo>
-                  <a:pt x="1338068" y="13353"/>
-                  <a:pt x="1431663" y="-25862"/>
-                  <a:pt x="1651406" y="0"/>
-                </a:cubicBezTo>
-                <a:cubicBezTo>
-                  <a:pt x="1871149" y="25862"/>
-                  <a:pt x="2173163" y="23827"/>
-                  <a:pt x="2336292" y="0"/>
-                </a:cubicBezTo>
-                <a:cubicBezTo>
-                  <a:pt x="2499421" y="-23827"/>
-                  <a:pt x="2720589" y="28148"/>
-                  <a:pt x="2931566" y="0"/>
-                </a:cubicBezTo>
-                <a:cubicBezTo>
-                  <a:pt x="3142543" y="-28148"/>
-                  <a:pt x="3323630" y="27022"/>
-                  <a:pt x="3482035" y="0"/>
-                </a:cubicBezTo>
-                <a:cubicBezTo>
-                  <a:pt x="3640440" y="-27022"/>
-                  <a:pt x="4012110" y="-20118"/>
-                  <a:pt x="4480560" y="0"/>
-                </a:cubicBezTo>
-                <a:cubicBezTo>
-                  <a:pt x="4480958" y="7429"/>
-                  <a:pt x="4480540" y="10822"/>
-                  <a:pt x="4480560" y="18288"/>
-                </a:cubicBezTo>
-                <a:cubicBezTo>
-                  <a:pt x="4314132" y="14924"/>
-                  <a:pt x="4028383" y="36632"/>
-                  <a:pt x="3840480" y="18288"/>
-                </a:cubicBezTo>
-                <a:cubicBezTo>
-                  <a:pt x="3652577" y="-56"/>
-                  <a:pt x="3547615" y="2848"/>
-                  <a:pt x="3290011" y="18288"/>
-                </a:cubicBezTo>
-                <a:cubicBezTo>
-                  <a:pt x="3032407" y="33728"/>
-                  <a:pt x="2830268" y="8719"/>
-                  <a:pt x="2560320" y="18288"/>
-                </a:cubicBezTo>
-                <a:cubicBezTo>
-                  <a:pt x="2290372" y="27857"/>
-                  <a:pt x="2147422" y="6728"/>
-                  <a:pt x="1965046" y="18288"/>
-                </a:cubicBezTo>
-                <a:cubicBezTo>
-                  <a:pt x="1782670" y="29848"/>
-                  <a:pt x="1689791" y="40680"/>
-                  <a:pt x="1459382" y="18288"/>
-                </a:cubicBezTo>
-                <a:cubicBezTo>
-                  <a:pt x="1228973" y="-4104"/>
-                  <a:pt x="915486" y="36501"/>
-                  <a:pt x="774497" y="18288"/>
-                </a:cubicBezTo>
-                <a:cubicBezTo>
-                  <a:pt x="633508" y="75"/>
-                  <a:pt x="361442" y="-11107"/>
-                  <a:pt x="0" y="18288"/>
-                </a:cubicBezTo>
-                <a:cubicBezTo>
-                  <a:pt x="-591" y="13205"/>
-                  <a:pt x="-663" y="6329"/>
-                  <a:pt x="0" y="0"/>
-                </a:cubicBezTo>
-                <a:close/>
-              </a:path>
-              <a:path w="4480560" h="18288" stroke="0" extrusionOk="0">
-                <a:moveTo>
-                  <a:pt x="0" y="0"/>
-                </a:moveTo>
-                <a:cubicBezTo>
-                  <a:pt x="285465" y="225"/>
-                  <a:pt x="322691" y="16223"/>
-                  <a:pt x="595274" y="0"/>
-                </a:cubicBezTo>
-                <a:cubicBezTo>
-                  <a:pt x="867857" y="-16223"/>
-                  <a:pt x="989129" y="-11242"/>
-                  <a:pt x="1100938" y="0"/>
-                </a:cubicBezTo>
-                <a:cubicBezTo>
-                  <a:pt x="1212747" y="11242"/>
-                  <a:pt x="1574350" y="-36410"/>
-                  <a:pt x="1830629" y="0"/>
-                </a:cubicBezTo>
-                <a:cubicBezTo>
-                  <a:pt x="2086908" y="36410"/>
-                  <a:pt x="2180922" y="4645"/>
-                  <a:pt x="2425903" y="0"/>
-                </a:cubicBezTo>
-                <a:cubicBezTo>
-                  <a:pt x="2670884" y="-4645"/>
-                  <a:pt x="2782024" y="22929"/>
-                  <a:pt x="3021178" y="0"/>
-                </a:cubicBezTo>
-                <a:cubicBezTo>
-                  <a:pt x="3260332" y="-22929"/>
-                  <a:pt x="3456982" y="-1586"/>
-                  <a:pt x="3750869" y="0"/>
-                </a:cubicBezTo>
-                <a:cubicBezTo>
-                  <a:pt x="4044756" y="1586"/>
-                  <a:pt x="4302726" y="17043"/>
-                  <a:pt x="4480560" y="0"/>
-                </a:cubicBezTo>
-                <a:cubicBezTo>
-                  <a:pt x="4479674" y="5429"/>
-                  <a:pt x="4481381" y="14046"/>
-                  <a:pt x="4480560" y="18288"/>
-                </a:cubicBezTo>
-                <a:cubicBezTo>
-                  <a:pt x="4279652" y="-6850"/>
-                  <a:pt x="4200762" y="41566"/>
-                  <a:pt x="3930091" y="18288"/>
-                </a:cubicBezTo>
-                <a:cubicBezTo>
-                  <a:pt x="3659420" y="-4990"/>
-                  <a:pt x="3456052" y="22294"/>
-                  <a:pt x="3290011" y="18288"/>
-                </a:cubicBezTo>
-                <a:cubicBezTo>
-                  <a:pt x="3123970" y="14282"/>
-                  <a:pt x="2882392" y="32818"/>
-                  <a:pt x="2649931" y="18288"/>
-                </a:cubicBezTo>
-                <a:cubicBezTo>
-                  <a:pt x="2417470" y="3758"/>
-                  <a:pt x="2238426" y="7337"/>
-                  <a:pt x="2054657" y="18288"/>
-                </a:cubicBezTo>
-                <a:cubicBezTo>
-                  <a:pt x="1870888" y="29239"/>
-                  <a:pt x="1566368" y="45040"/>
-                  <a:pt x="1324966" y="18288"/>
-                </a:cubicBezTo>
-                <a:cubicBezTo>
-                  <a:pt x="1083564" y="-8464"/>
-                  <a:pt x="787410" y="10946"/>
-                  <a:pt x="595274" y="18288"/>
-                </a:cubicBezTo>
-                <a:cubicBezTo>
-                  <a:pt x="403138" y="25630"/>
-                  <a:pt x="169622" y="10499"/>
-                  <a:pt x="0" y="18288"/>
-                </a:cubicBezTo>
-                <a:cubicBezTo>
-                  <a:pt x="668" y="13665"/>
-                  <a:pt x="578" y="5675"/>
-                  <a:pt x="0" y="0"/>
-                </a:cubicBezTo>
-                <a:close/>
-              </a:path>
-            </a:pathLst>
-          </a:custGeom>
-          <a:solidFill>
-            <a:schemeClr val="accent2"/>
-          </a:solidFill>
-          <a:ln w="41275" cap="rnd">
-            <a:solidFill>
-              <a:schemeClr val="accent2"/>
-            </a:solidFill>
-            <a:round/>
-            <a:extLst>
-              <a:ext uri="{C807C97D-BFC1-408E-A445-0C87EB9F89A2}">
-                <ask:lineSketchStyleProps xmlns:ask="http://schemas.microsoft.com/office/drawing/2018/sketchyshapes" sd="1219033472">
-                  <a:prstGeom prst="rect">
-                    <a:avLst/>
-                  </a:prstGeom>
-                  <ask:type>
-                    <ask:lineSketchFreehand/>
-                  </ask:type>
-                </ask:lineSketchStyleProps>
-              </a:ext>
-            </a:extLst>
-          </a:ln>
-        </p:spPr>
-        <p:style>
-          <a:lnRef idx="2">
-            <a:schemeClr val="accent1">
-              <a:shade val="50000"/>
-            </a:schemeClr>
-          </a:lnRef>
-          <a:fillRef idx="1">
-            <a:schemeClr val="accent1"/>
-          </a:fillRef>
-          <a:effectRef idx="0">
-            <a:schemeClr val="accent1"/>
-          </a:effectRef>
-          <a:fontRef idx="minor">
-            <a:schemeClr val="lt1"/>
-          </a:fontRef>
-        </p:style>
-        <p:txBody>
-          <a:bodyPr rtlCol="0" anchor="ctr"/>
-          <a:lstStyle/>
-          <a:p>
-            <a:pPr algn="ctr"/>
-            <a:endParaRPr lang="en-US"/>
-          </a:p>
-        </p:txBody>
-      </p:sp>
-      <p:sp>
-        <p:nvSpPr>
-          <p:cNvPr id="3" name="Content Placeholder 2"/>
-          <p:cNvSpPr>
-            <a:spLocks noGrp="1"/>
-          </p:cNvSpPr>
-          <p:nvPr>
-            <p:ph idx="1"/>
-          </p:nvPr>
-        </p:nvSpPr>
-        <p:spPr>
-          <a:xfrm>
-            <a:off x="5126418" y="552091"/>
-            <a:ext cx="6224335" cy="5431536"/>
-          </a:xfrm>
-        </p:spPr>
-        <p:txBody>
-          <a:bodyPr anchor="ctr">
-            <a:normAutofit/>
-          </a:bodyPr>
-          <a:lstStyle/>
-          <a:p>
-            <a:pPr marL="201168" lvl="1" indent="0" fontAlgn="base">
-              <a:buNone/>
-            </a:pPr>
-            <a:r>
-              <a:rPr lang="en-US" sz="2200" dirty="0">
-                <a:hlinkClick r:id="rId3"/>
-              </a:rPr>
-              <a:t>https://github.com/praveenraghuvanshi/tech-sessions/tree/master/14042022-Practical-ML-Net-Sound-Classification</a:t>
-            </a:r>
-            <a:endParaRPr lang="en-US" sz="2200" dirty="0"/>
-          </a:p>
-        </p:txBody>
-      </p:sp>
-      <p:sp>
-        <p:nvSpPr>
-          <p:cNvPr id="5" name="Footer Placeholder 3"/>
-          <p:cNvSpPr>
-            <a:spLocks noGrp="1"/>
-          </p:cNvSpPr>
-          <p:nvPr>
-            <p:ph type="ftr" sz="quarter" idx="11"/>
-          </p:nvPr>
-        </p:nvSpPr>
-        <p:spPr>
-          <a:xfrm>
-            <a:off x="4038600" y="6356350"/>
-            <a:ext cx="4114800" cy="365125"/>
-          </a:xfrm>
-        </p:spPr>
-        <p:txBody>
-          <a:bodyPr>
-            <a:normAutofit/>
-          </a:bodyPr>
-          <a:lstStyle/>
-          <a:p>
-            <a:pPr>
-              <a:spcAft>
-                <a:spcPts val="600"/>
-              </a:spcAft>
-            </a:pPr>
-            <a:r>
-              <a:rPr lang="en-US"/>
-              <a:t>@</a:t>
-            </a:r>
-            <a:r>
-              <a:rPr lang="en-US" err="1"/>
-              <a:t>praveenraghuvan</a:t>
-            </a:r>
-            <a:endParaRPr lang="en-US"/>
-          </a:p>
-        </p:txBody>
-      </p:sp>
-      <p:pic>
-        <p:nvPicPr>
-          <p:cNvPr id="4" name="Picture 3">
-            <a:extLst>
-              <a:ext uri="{FF2B5EF4-FFF2-40B4-BE49-F238E27FC236}">
-                <a16:creationId xmlns:a16="http://schemas.microsoft.com/office/drawing/2014/main" id="{4C0B1ADE-2E39-9F68-E8E2-43020170F708}"/>
-              </a:ext>
-            </a:extLst>
-          </p:cNvPr>
-          <p:cNvPicPr>
-            <a:picLocks noChangeAspect="1"/>
-          </p:cNvPicPr>
-          <p:nvPr/>
-        </p:nvPicPr>
-        <p:blipFill>
-          <a:blip r:embed="rId4"/>
-          <a:stretch>
-            <a:fillRect/>
-          </a:stretch>
-        </p:blipFill>
-        <p:spPr>
-          <a:xfrm>
-            <a:off x="10561314" y="33090"/>
-            <a:ext cx="1630685" cy="365125"/>
-          </a:xfrm>
-          <a:prstGeom prst="rect">
-            <a:avLst/>
-          </a:prstGeom>
-        </p:spPr>
-      </p:pic>
-      <p:pic>
-        <p:nvPicPr>
-          <p:cNvPr id="6" name="Picture 5">
-            <a:extLst>
-              <a:ext uri="{FF2B5EF4-FFF2-40B4-BE49-F238E27FC236}">
-                <a16:creationId xmlns:a16="http://schemas.microsoft.com/office/drawing/2014/main" id="{93875B6E-372D-59C9-5B92-555744F092E9}"/>
-              </a:ext>
-            </a:extLst>
-          </p:cNvPr>
-          <p:cNvPicPr>
-            <a:picLocks noChangeAspect="1"/>
-          </p:cNvPicPr>
-          <p:nvPr/>
-        </p:nvPicPr>
-        <p:blipFill>
-          <a:blip r:embed="rId5"/>
-          <a:stretch>
-            <a:fillRect/>
-          </a:stretch>
-        </p:blipFill>
-        <p:spPr>
-          <a:xfrm>
-            <a:off x="7791654" y="2199045"/>
-            <a:ext cx="523875" cy="533400"/>
-          </a:xfrm>
-          <a:prstGeom prst="rect">
-            <a:avLst/>
-          </a:prstGeom>
-        </p:spPr>
-      </p:pic>
-    </p:spTree>
-    <p:extLst>
-      <p:ext uri="{BB962C8B-B14F-4D97-AF65-F5344CB8AC3E}">
-        <p14:creationId xmlns:p14="http://schemas.microsoft.com/office/powerpoint/2010/main" val="1550265034"/>
-      </p:ext>
-    </p:extLst>
-  </p:cSld>
-  <p:clrMapOvr>
-    <a:masterClrMapping/>
-  </p:clrMapOvr>
-</p:sld>
-</file>
-
-<file path=ppt/slides/slide11.xml><?xml version="1.0" encoding="utf-8"?>
-<p:sld xmlns:a="http://schemas.openxmlformats.org/drawingml/2006/main" xmlns:r="http://schemas.openxmlformats.org/officeDocument/2006/relationships" xmlns:p="http://schemas.openxmlformats.org/presentationml/2006/main">
-  <p:cSld>
     <p:spTree>
       <p:nvGrpSpPr>
         <p:cNvPr id="1" name=""/>
@@ -11329,341 +10724,6 @@
 <file path=ppt/slides/slide8.xml><?xml version="1.0" encoding="utf-8"?>
 <p:sld xmlns:a="http://schemas.openxmlformats.org/drawingml/2006/main" xmlns:r="http://schemas.openxmlformats.org/officeDocument/2006/relationships" xmlns:p="http://schemas.openxmlformats.org/presentationml/2006/main">
   <p:cSld>
-    <p:spTree>
-      <p:nvGrpSpPr>
-        <p:cNvPr id="1" name=""/>
-        <p:cNvGrpSpPr/>
-        <p:nvPr/>
-      </p:nvGrpSpPr>
-      <p:grpSpPr>
-        <a:xfrm>
-          <a:off x="0" y="0"/>
-          <a:ext cx="0" cy="0"/>
-          <a:chOff x="0" y="0"/>
-          <a:chExt cx="0" cy="0"/>
-        </a:xfrm>
-      </p:grpSpPr>
-      <p:sp>
-        <p:nvSpPr>
-          <p:cNvPr id="2" name="Title 1"/>
-          <p:cNvSpPr>
-            <a:spLocks noGrp="1"/>
-          </p:cNvSpPr>
-          <p:nvPr>
-            <p:ph type="title"/>
-          </p:nvPr>
-        </p:nvSpPr>
-        <p:spPr/>
-        <p:txBody>
-          <a:bodyPr/>
-          <a:lstStyle/>
-          <a:p>
-            <a:r>
-              <a:rPr lang="en-US" dirty="0"/>
-              <a:t>Framework and Tools</a:t>
-            </a:r>
-          </a:p>
-        </p:txBody>
-      </p:sp>
-      <p:sp>
-        <p:nvSpPr>
-          <p:cNvPr id="10" name="Footer Placeholder 3"/>
-          <p:cNvSpPr>
-            <a:spLocks noGrp="1"/>
-          </p:cNvSpPr>
-          <p:nvPr>
-            <p:ph type="ftr" sz="quarter" idx="11"/>
-          </p:nvPr>
-        </p:nvSpPr>
-        <p:spPr>
-          <a:xfrm>
-            <a:off x="4768854" y="6428220"/>
-            <a:ext cx="2714615" cy="365125"/>
-          </a:xfrm>
-        </p:spPr>
-        <p:txBody>
-          <a:bodyPr/>
-          <a:lstStyle/>
-          <a:p>
-            <a:r>
-              <a:rPr lang="en-US" sz="2000" dirty="0"/>
-              <a:t>@</a:t>
-            </a:r>
-            <a:r>
-              <a:rPr lang="en-US" sz="2000" dirty="0" err="1"/>
-              <a:t>praveenraghuvan</a:t>
-            </a:r>
-            <a:endParaRPr lang="en-US" sz="2000" dirty="0"/>
-          </a:p>
-        </p:txBody>
-      </p:sp>
-      <p:pic>
-        <p:nvPicPr>
-          <p:cNvPr id="6" name="Picture Placeholder 17">
-            <a:extLst>
-              <a:ext uri="{FF2B5EF4-FFF2-40B4-BE49-F238E27FC236}">
-                <a16:creationId xmlns:a16="http://schemas.microsoft.com/office/drawing/2014/main" id="{297AF8FE-285D-4720-84FC-68EB97DB4170}"/>
-              </a:ext>
-            </a:extLst>
-          </p:cNvPr>
-          <p:cNvPicPr>
-            <a:picLocks noChangeAspect="1"/>
-          </p:cNvPicPr>
-          <p:nvPr/>
-        </p:nvPicPr>
-        <p:blipFill>
-          <a:blip r:embed="rId2">
-            <a:extLst>
-              <a:ext uri="{28A0092B-C50C-407E-A947-70E740481C1C}">
-                <a14:useLocalDpi xmlns:a14="http://schemas.microsoft.com/office/drawing/2010/main" val="0"/>
-              </a:ext>
-            </a:extLst>
-          </a:blip>
-          <a:stretch>
-            <a:fillRect/>
-          </a:stretch>
-        </p:blipFill>
-        <p:spPr>
-          <a:xfrm>
-            <a:off x="1737738" y="2035409"/>
-            <a:ext cx="1894810" cy="2129000"/>
-          </a:xfrm>
-          <a:prstGeom prst="rect">
-            <a:avLst/>
-          </a:prstGeom>
-        </p:spPr>
-      </p:pic>
-      <p:pic>
-        <p:nvPicPr>
-          <p:cNvPr id="7" name="Picture Placeholder 12">
-            <a:extLst>
-              <a:ext uri="{FF2B5EF4-FFF2-40B4-BE49-F238E27FC236}">
-                <a16:creationId xmlns:a16="http://schemas.microsoft.com/office/drawing/2014/main" id="{EFB73F43-2C79-45BA-9645-25BE809B29AE}"/>
-              </a:ext>
-            </a:extLst>
-          </p:cNvPr>
-          <p:cNvPicPr>
-            <a:picLocks noChangeAspect="1"/>
-          </p:cNvPicPr>
-          <p:nvPr/>
-        </p:nvPicPr>
-        <p:blipFill>
-          <a:blip r:embed="rId3">
-            <a:extLst>
-              <a:ext uri="{28A0092B-C50C-407E-A947-70E740481C1C}">
-                <a14:useLocalDpi xmlns:a14="http://schemas.microsoft.com/office/drawing/2010/main" val="0"/>
-              </a:ext>
-            </a:extLst>
-          </a:blip>
-          <a:stretch>
-            <a:fillRect/>
-          </a:stretch>
-        </p:blipFill>
-        <p:spPr>
-          <a:xfrm>
-            <a:off x="5041649" y="1409834"/>
-            <a:ext cx="2885315" cy="2885315"/>
-          </a:xfrm>
-          <a:prstGeom prst="rect">
-            <a:avLst/>
-          </a:prstGeom>
-        </p:spPr>
-      </p:pic>
-      <p:pic>
-        <p:nvPicPr>
-          <p:cNvPr id="9" name="Picture Placeholder 13">
-            <a:extLst>
-              <a:ext uri="{FF2B5EF4-FFF2-40B4-BE49-F238E27FC236}">
-                <a16:creationId xmlns:a16="http://schemas.microsoft.com/office/drawing/2014/main" id="{266A45FB-CD64-4D84-A140-E6B64FC83B3B}"/>
-              </a:ext>
-            </a:extLst>
-          </p:cNvPr>
-          <p:cNvPicPr>
-            <a:picLocks noChangeAspect="1"/>
-          </p:cNvPicPr>
-          <p:nvPr/>
-        </p:nvPicPr>
-        <p:blipFill>
-          <a:blip r:embed="rId4">
-            <a:extLst>
-              <a:ext uri="{28A0092B-C50C-407E-A947-70E740481C1C}">
-                <a14:useLocalDpi xmlns:a14="http://schemas.microsoft.com/office/drawing/2010/main" val="0"/>
-              </a:ext>
-            </a:extLst>
-          </a:blip>
-          <a:stretch>
-            <a:fillRect/>
-          </a:stretch>
-        </p:blipFill>
-        <p:spPr>
-          <a:xfrm>
-            <a:off x="9123666" y="1828103"/>
-            <a:ext cx="2515897" cy="2515897"/>
-          </a:xfrm>
-          <a:prstGeom prst="rect">
-            <a:avLst/>
-          </a:prstGeom>
-        </p:spPr>
-      </p:pic>
-      <p:pic>
-        <p:nvPicPr>
-          <p:cNvPr id="11" name="Picture Placeholder 15">
-            <a:extLst>
-              <a:ext uri="{FF2B5EF4-FFF2-40B4-BE49-F238E27FC236}">
-                <a16:creationId xmlns:a16="http://schemas.microsoft.com/office/drawing/2014/main" id="{6E302CB7-E646-444E-9991-BDF27E0F5F81}"/>
-              </a:ext>
-            </a:extLst>
-          </p:cNvPr>
-          <p:cNvPicPr>
-            <a:picLocks noChangeAspect="1"/>
-          </p:cNvPicPr>
-          <p:nvPr/>
-        </p:nvPicPr>
-        <p:blipFill>
-          <a:blip r:embed="rId5">
-            <a:extLst>
-              <a:ext uri="{28A0092B-C50C-407E-A947-70E740481C1C}">
-                <a14:useLocalDpi xmlns:a14="http://schemas.microsoft.com/office/drawing/2010/main" val="0"/>
-              </a:ext>
-            </a:extLst>
-          </a:blip>
-          <a:stretch>
-            <a:fillRect/>
-          </a:stretch>
-        </p:blipFill>
-        <p:spPr>
-          <a:xfrm>
-            <a:off x="838201" y="4494282"/>
-            <a:ext cx="4748408" cy="1734805"/>
-          </a:xfrm>
-          <a:prstGeom prst="rect">
-            <a:avLst/>
-          </a:prstGeom>
-        </p:spPr>
-      </p:pic>
-      <p:pic>
-        <p:nvPicPr>
-          <p:cNvPr id="1026" name="Picture 2" descr="How to render an Audio Wave Image from a MP3 audio file with NAudio in C#  WinForms | Our Code World">
-            <a:extLst>
-              <a:ext uri="{FF2B5EF4-FFF2-40B4-BE49-F238E27FC236}">
-                <a16:creationId xmlns:a16="http://schemas.microsoft.com/office/drawing/2014/main" id="{1012DABA-61E7-495A-B417-601A67BC0249}"/>
-              </a:ext>
-            </a:extLst>
-          </p:cNvPr>
-          <p:cNvPicPr>
-            <a:picLocks noChangeAspect="1" noChangeArrowheads="1"/>
-          </p:cNvPicPr>
-          <p:nvPr/>
-        </p:nvPicPr>
-        <p:blipFill>
-          <a:blip r:embed="rId6">
-            <a:extLst>
-              <a:ext uri="{28A0092B-C50C-407E-A947-70E740481C1C}">
-                <a14:useLocalDpi xmlns:a14="http://schemas.microsoft.com/office/drawing/2010/main" val="0"/>
-              </a:ext>
-            </a:extLst>
-          </a:blip>
-          <a:srcRect/>
-          <a:stretch>
-            <a:fillRect/>
-          </a:stretch>
-        </p:blipFill>
-        <p:spPr bwMode="auto">
-          <a:xfrm>
-            <a:off x="5629618" y="4527017"/>
-            <a:ext cx="3130287" cy="1565144"/>
-          </a:xfrm>
-          <a:prstGeom prst="rect">
-            <a:avLst/>
-          </a:prstGeom>
-          <a:noFill/>
-          <a:extLst>
-            <a:ext uri="{909E8E84-426E-40DD-AFC4-6F175D3DCCD1}">
-              <a14:hiddenFill xmlns:a14="http://schemas.microsoft.com/office/drawing/2010/main">
-                <a:solidFill>
-                  <a:srgbClr val="FFFFFF"/>
-                </a:solidFill>
-              </a14:hiddenFill>
-            </a:ext>
-          </a:extLst>
-        </p:spPr>
-      </p:pic>
-      <p:pic>
-        <p:nvPicPr>
-          <p:cNvPr id="13" name="Picture 12">
-            <a:extLst>
-              <a:ext uri="{FF2B5EF4-FFF2-40B4-BE49-F238E27FC236}">
-                <a16:creationId xmlns:a16="http://schemas.microsoft.com/office/drawing/2014/main" id="{9B8A9388-CDEB-496E-BE3E-869CCA7C049C}"/>
-              </a:ext>
-            </a:extLst>
-          </p:cNvPr>
-          <p:cNvPicPr>
-            <a:picLocks noChangeAspect="1"/>
-          </p:cNvPicPr>
-          <p:nvPr/>
-        </p:nvPicPr>
-        <p:blipFill>
-          <a:blip r:embed="rId7"/>
-          <a:stretch>
-            <a:fillRect/>
-          </a:stretch>
-        </p:blipFill>
-        <p:spPr>
-          <a:xfrm>
-            <a:off x="8849457" y="4617113"/>
-            <a:ext cx="2843786" cy="1475048"/>
-          </a:xfrm>
-          <a:prstGeom prst="rect">
-            <a:avLst/>
-          </a:prstGeom>
-        </p:spPr>
-      </p:pic>
-      <p:pic>
-        <p:nvPicPr>
-          <p:cNvPr id="3" name="Picture 2">
-            <a:extLst>
-              <a:ext uri="{FF2B5EF4-FFF2-40B4-BE49-F238E27FC236}">
-                <a16:creationId xmlns:a16="http://schemas.microsoft.com/office/drawing/2014/main" id="{9D2CB167-4885-DAF2-906C-331148855B36}"/>
-              </a:ext>
-            </a:extLst>
-          </p:cNvPr>
-          <p:cNvPicPr>
-            <a:picLocks noChangeAspect="1"/>
-          </p:cNvPicPr>
-          <p:nvPr/>
-        </p:nvPicPr>
-        <p:blipFill>
-          <a:blip r:embed="rId8"/>
-          <a:stretch>
-            <a:fillRect/>
-          </a:stretch>
-        </p:blipFill>
-        <p:spPr>
-          <a:xfrm>
-            <a:off x="10561314" y="33090"/>
-            <a:ext cx="1630685" cy="365125"/>
-          </a:xfrm>
-          <a:prstGeom prst="rect">
-            <a:avLst/>
-          </a:prstGeom>
-        </p:spPr>
-      </p:pic>
-    </p:spTree>
-    <p:extLst>
-      <p:ext uri="{BB962C8B-B14F-4D97-AF65-F5344CB8AC3E}">
-        <p14:creationId xmlns:p14="http://schemas.microsoft.com/office/powerpoint/2010/main" val="646631496"/>
-      </p:ext>
-    </p:extLst>
-  </p:cSld>
-  <p:clrMapOvr>
-    <a:masterClrMapping/>
-  </p:clrMapOvr>
-</p:sld>
-</file>
-
-<file path=ppt/slides/slide9.xml><?xml version="1.0" encoding="utf-8"?>
-<p:sld xmlns:a="http://schemas.openxmlformats.org/drawingml/2006/main" xmlns:r="http://schemas.openxmlformats.org/officeDocument/2006/relationships" xmlns:p="http://schemas.openxmlformats.org/presentationml/2006/main">
-  <p:cSld>
     <p:bg>
       <p:bgPr>
         <a:solidFill>
@@ -12272,6 +11332,610 @@
     <p:extLst>
       <p:ext uri="{BB962C8B-B14F-4D97-AF65-F5344CB8AC3E}">
         <p14:creationId xmlns:p14="http://schemas.microsoft.com/office/powerpoint/2010/main" val="3123454041"/>
+      </p:ext>
+    </p:extLst>
+  </p:cSld>
+  <p:clrMapOvr>
+    <a:masterClrMapping/>
+  </p:clrMapOvr>
+</p:sld>
+</file>
+
+<file path=ppt/slides/slide9.xml><?xml version="1.0" encoding="utf-8"?>
+<p:sld xmlns:a="http://schemas.openxmlformats.org/drawingml/2006/main" xmlns:r="http://schemas.openxmlformats.org/officeDocument/2006/relationships" xmlns:p="http://schemas.openxmlformats.org/presentationml/2006/main">
+  <p:cSld>
+    <p:bg>
+      <p:bgPr>
+        <a:solidFill>
+          <a:schemeClr val="bg1"/>
+        </a:solidFill>
+        <a:effectLst/>
+      </p:bgPr>
+    </p:bg>
+    <p:spTree>
+      <p:nvGrpSpPr>
+        <p:cNvPr id="1" name=""/>
+        <p:cNvGrpSpPr/>
+        <p:nvPr/>
+      </p:nvGrpSpPr>
+      <p:grpSpPr>
+        <a:xfrm>
+          <a:off x="0" y="0"/>
+          <a:ext cx="0" cy="0"/>
+          <a:chOff x="0" y="0"/>
+          <a:chExt cx="0" cy="0"/>
+        </a:xfrm>
+      </p:grpSpPr>
+      <p:sp useBgFill="1">
+        <p:nvSpPr>
+          <p:cNvPr id="10" name="Rectangle 9">
+            <a:extLst>
+              <a:ext uri="{FF2B5EF4-FFF2-40B4-BE49-F238E27FC236}">
+                <a16:creationId xmlns:a16="http://schemas.microsoft.com/office/drawing/2014/main" id="{777A147A-9ED8-46B4-8660-1B3C2AA880B5}"/>
+              </a:ext>
+              <a:ext uri="{C183D7F6-B498-43B3-948B-1728B52AA6E4}">
+                <adec:decorative xmlns:adec="http://schemas.microsoft.com/office/drawing/2017/decorative" val="1"/>
+              </a:ext>
+            </a:extLst>
+          </p:cNvPr>
+          <p:cNvSpPr>
+            <a:spLocks noGrp="1" noRot="1" noChangeAspect="1" noMove="1" noResize="1" noEditPoints="1" noAdjustHandles="1" noChangeArrowheads="1" noChangeShapeType="1" noTextEdit="1"/>
+          </p:cNvSpPr>
+          <p:nvPr>
+            <p:extLst>
+              <p:ext uri="{386F3935-93C4-4BCD-93E2-E3B085C9AB24}">
+                <p16:designElem xmlns:p16="http://schemas.microsoft.com/office/powerpoint/2015/main" val="1"/>
+              </p:ext>
+            </p:extLst>
+          </p:nvPr>
+        </p:nvSpPr>
+        <p:spPr>
+          <a:xfrm>
+            <a:off x="0" y="0"/>
+            <a:ext cx="12188952" cy="6858000"/>
+          </a:xfrm>
+          <a:prstGeom prst="rect">
+            <a:avLst/>
+          </a:prstGeom>
+          <a:ln>
+            <a:noFill/>
+          </a:ln>
+        </p:spPr>
+        <p:style>
+          <a:lnRef idx="2">
+            <a:schemeClr val="accent1">
+              <a:shade val="50000"/>
+            </a:schemeClr>
+          </a:lnRef>
+          <a:fillRef idx="1">
+            <a:schemeClr val="accent1"/>
+          </a:fillRef>
+          <a:effectRef idx="0">
+            <a:schemeClr val="accent1"/>
+          </a:effectRef>
+          <a:fontRef idx="minor">
+            <a:schemeClr val="lt1"/>
+          </a:fontRef>
+        </p:style>
+        <p:txBody>
+          <a:bodyPr rtlCol="0" anchor="ctr"/>
+          <a:lstStyle/>
+          <a:p>
+            <a:pPr algn="ctr"/>
+            <a:endParaRPr lang="en-US"/>
+          </a:p>
+        </p:txBody>
+      </p:sp>
+      <p:sp>
+        <p:nvSpPr>
+          <p:cNvPr id="2" name="Title 1"/>
+          <p:cNvSpPr>
+            <a:spLocks noGrp="1"/>
+          </p:cNvSpPr>
+          <p:nvPr>
+            <p:ph type="title"/>
+          </p:nvPr>
+        </p:nvSpPr>
+        <p:spPr>
+          <a:xfrm>
+            <a:off x="841248" y="548640"/>
+            <a:ext cx="3600860" cy="5431536"/>
+          </a:xfrm>
+        </p:spPr>
+        <p:txBody>
+          <a:bodyPr>
+            <a:normAutofit/>
+          </a:bodyPr>
+          <a:lstStyle/>
+          <a:p>
+            <a:r>
+              <a:rPr lang="en-US" sz="5400"/>
+              <a:t>Resources</a:t>
+            </a:r>
+          </a:p>
+        </p:txBody>
+      </p:sp>
+      <p:sp>
+        <p:nvSpPr>
+          <p:cNvPr id="12" name="sketch line">
+            <a:extLst>
+              <a:ext uri="{FF2B5EF4-FFF2-40B4-BE49-F238E27FC236}">
+                <a16:creationId xmlns:a16="http://schemas.microsoft.com/office/drawing/2014/main" id="{5D6C15A0-C087-4593-8414-2B4EC1CDC3DE}"/>
+              </a:ext>
+              <a:ext uri="{C183D7F6-B498-43B3-948B-1728B52AA6E4}">
+                <adec:decorative xmlns:adec="http://schemas.microsoft.com/office/drawing/2017/decorative" val="1"/>
+              </a:ext>
+            </a:extLst>
+          </p:cNvPr>
+          <p:cNvSpPr>
+            <a:spLocks noGrp="1" noRot="1" noChangeAspect="1" noMove="1" noResize="1" noEditPoints="1" noAdjustHandles="1" noChangeArrowheads="1" noChangeShapeType="1" noTextEdit="1"/>
+          </p:cNvSpPr>
+          <p:nvPr>
+            <p:extLst>
+              <p:ext uri="{386F3935-93C4-4BCD-93E2-E3B085C9AB24}">
+                <p16:designElem xmlns:p16="http://schemas.microsoft.com/office/powerpoint/2015/main" val="1"/>
+              </p:ext>
+            </p:extLst>
+          </p:nvPr>
+        </p:nvSpPr>
+        <p:spPr>
+          <a:xfrm rot="5400000">
+            <a:off x="2543983" y="3258715"/>
+            <a:ext cx="4480560" cy="18288"/>
+          </a:xfrm>
+          <a:custGeom>
+            <a:avLst/>
+            <a:gdLst>
+              <a:gd name="connsiteX0" fmla="*/ 0 w 4480560"/>
+              <a:gd name="connsiteY0" fmla="*/ 0 h 18288"/>
+              <a:gd name="connsiteX1" fmla="*/ 595274 w 4480560"/>
+              <a:gd name="connsiteY1" fmla="*/ 0 h 18288"/>
+              <a:gd name="connsiteX2" fmla="*/ 1100938 w 4480560"/>
+              <a:gd name="connsiteY2" fmla="*/ 0 h 18288"/>
+              <a:gd name="connsiteX3" fmla="*/ 1651406 w 4480560"/>
+              <a:gd name="connsiteY3" fmla="*/ 0 h 18288"/>
+              <a:gd name="connsiteX4" fmla="*/ 2336292 w 4480560"/>
+              <a:gd name="connsiteY4" fmla="*/ 0 h 18288"/>
+              <a:gd name="connsiteX5" fmla="*/ 2931566 w 4480560"/>
+              <a:gd name="connsiteY5" fmla="*/ 0 h 18288"/>
+              <a:gd name="connsiteX6" fmla="*/ 3482035 w 4480560"/>
+              <a:gd name="connsiteY6" fmla="*/ 0 h 18288"/>
+              <a:gd name="connsiteX7" fmla="*/ 4480560 w 4480560"/>
+              <a:gd name="connsiteY7" fmla="*/ 0 h 18288"/>
+              <a:gd name="connsiteX8" fmla="*/ 4480560 w 4480560"/>
+              <a:gd name="connsiteY8" fmla="*/ 18288 h 18288"/>
+              <a:gd name="connsiteX9" fmla="*/ 3840480 w 4480560"/>
+              <a:gd name="connsiteY9" fmla="*/ 18288 h 18288"/>
+              <a:gd name="connsiteX10" fmla="*/ 3290011 w 4480560"/>
+              <a:gd name="connsiteY10" fmla="*/ 18288 h 18288"/>
+              <a:gd name="connsiteX11" fmla="*/ 2560320 w 4480560"/>
+              <a:gd name="connsiteY11" fmla="*/ 18288 h 18288"/>
+              <a:gd name="connsiteX12" fmla="*/ 1965046 w 4480560"/>
+              <a:gd name="connsiteY12" fmla="*/ 18288 h 18288"/>
+              <a:gd name="connsiteX13" fmla="*/ 1459382 w 4480560"/>
+              <a:gd name="connsiteY13" fmla="*/ 18288 h 18288"/>
+              <a:gd name="connsiteX14" fmla="*/ 774497 w 4480560"/>
+              <a:gd name="connsiteY14" fmla="*/ 18288 h 18288"/>
+              <a:gd name="connsiteX15" fmla="*/ 0 w 4480560"/>
+              <a:gd name="connsiteY15" fmla="*/ 18288 h 18288"/>
+              <a:gd name="connsiteX16" fmla="*/ 0 w 4480560"/>
+              <a:gd name="connsiteY16" fmla="*/ 0 h 18288"/>
+            </a:gdLst>
+            <a:ahLst/>
+            <a:cxnLst>
+              <a:cxn ang="0">
+                <a:pos x="connsiteX0" y="connsiteY0"/>
+              </a:cxn>
+              <a:cxn ang="0">
+                <a:pos x="connsiteX1" y="connsiteY1"/>
+              </a:cxn>
+              <a:cxn ang="0">
+                <a:pos x="connsiteX2" y="connsiteY2"/>
+              </a:cxn>
+              <a:cxn ang="0">
+                <a:pos x="connsiteX3" y="connsiteY3"/>
+              </a:cxn>
+              <a:cxn ang="0">
+                <a:pos x="connsiteX4" y="connsiteY4"/>
+              </a:cxn>
+              <a:cxn ang="0">
+                <a:pos x="connsiteX5" y="connsiteY5"/>
+              </a:cxn>
+              <a:cxn ang="0">
+                <a:pos x="connsiteX6" y="connsiteY6"/>
+              </a:cxn>
+              <a:cxn ang="0">
+                <a:pos x="connsiteX7" y="connsiteY7"/>
+              </a:cxn>
+              <a:cxn ang="0">
+                <a:pos x="connsiteX8" y="connsiteY8"/>
+              </a:cxn>
+              <a:cxn ang="0">
+                <a:pos x="connsiteX9" y="connsiteY9"/>
+              </a:cxn>
+              <a:cxn ang="0">
+                <a:pos x="connsiteX10" y="connsiteY10"/>
+              </a:cxn>
+              <a:cxn ang="0">
+                <a:pos x="connsiteX11" y="connsiteY11"/>
+              </a:cxn>
+              <a:cxn ang="0">
+                <a:pos x="connsiteX12" y="connsiteY12"/>
+              </a:cxn>
+              <a:cxn ang="0">
+                <a:pos x="connsiteX13" y="connsiteY13"/>
+              </a:cxn>
+              <a:cxn ang="0">
+                <a:pos x="connsiteX14" y="connsiteY14"/>
+              </a:cxn>
+              <a:cxn ang="0">
+                <a:pos x="connsiteX15" y="connsiteY15"/>
+              </a:cxn>
+              <a:cxn ang="0">
+                <a:pos x="connsiteX16" y="connsiteY16"/>
+              </a:cxn>
+            </a:cxnLst>
+            <a:rect l="l" t="t" r="r" b="b"/>
+            <a:pathLst>
+              <a:path w="4480560" h="18288" fill="none" extrusionOk="0">
+                <a:moveTo>
+                  <a:pt x="0" y="0"/>
+                </a:moveTo>
+                <a:cubicBezTo>
+                  <a:pt x="267821" y="8731"/>
+                  <a:pt x="334105" y="2629"/>
+                  <a:pt x="595274" y="0"/>
+                </a:cubicBezTo>
+                <a:cubicBezTo>
+                  <a:pt x="856443" y="-2629"/>
+                  <a:pt x="863808" y="-13353"/>
+                  <a:pt x="1100938" y="0"/>
+                </a:cubicBezTo>
+                <a:cubicBezTo>
+                  <a:pt x="1338068" y="13353"/>
+                  <a:pt x="1431663" y="-25862"/>
+                  <a:pt x="1651406" y="0"/>
+                </a:cubicBezTo>
+                <a:cubicBezTo>
+                  <a:pt x="1871149" y="25862"/>
+                  <a:pt x="2173163" y="23827"/>
+                  <a:pt x="2336292" y="0"/>
+                </a:cubicBezTo>
+                <a:cubicBezTo>
+                  <a:pt x="2499421" y="-23827"/>
+                  <a:pt x="2720589" y="28148"/>
+                  <a:pt x="2931566" y="0"/>
+                </a:cubicBezTo>
+                <a:cubicBezTo>
+                  <a:pt x="3142543" y="-28148"/>
+                  <a:pt x="3323630" y="27022"/>
+                  <a:pt x="3482035" y="0"/>
+                </a:cubicBezTo>
+                <a:cubicBezTo>
+                  <a:pt x="3640440" y="-27022"/>
+                  <a:pt x="4012110" y="-20118"/>
+                  <a:pt x="4480560" y="0"/>
+                </a:cubicBezTo>
+                <a:cubicBezTo>
+                  <a:pt x="4480958" y="7429"/>
+                  <a:pt x="4480540" y="10822"/>
+                  <a:pt x="4480560" y="18288"/>
+                </a:cubicBezTo>
+                <a:cubicBezTo>
+                  <a:pt x="4314132" y="14924"/>
+                  <a:pt x="4028383" y="36632"/>
+                  <a:pt x="3840480" y="18288"/>
+                </a:cubicBezTo>
+                <a:cubicBezTo>
+                  <a:pt x="3652577" y="-56"/>
+                  <a:pt x="3547615" y="2848"/>
+                  <a:pt x="3290011" y="18288"/>
+                </a:cubicBezTo>
+                <a:cubicBezTo>
+                  <a:pt x="3032407" y="33728"/>
+                  <a:pt x="2830268" y="8719"/>
+                  <a:pt x="2560320" y="18288"/>
+                </a:cubicBezTo>
+                <a:cubicBezTo>
+                  <a:pt x="2290372" y="27857"/>
+                  <a:pt x="2147422" y="6728"/>
+                  <a:pt x="1965046" y="18288"/>
+                </a:cubicBezTo>
+                <a:cubicBezTo>
+                  <a:pt x="1782670" y="29848"/>
+                  <a:pt x="1689791" y="40680"/>
+                  <a:pt x="1459382" y="18288"/>
+                </a:cubicBezTo>
+                <a:cubicBezTo>
+                  <a:pt x="1228973" y="-4104"/>
+                  <a:pt x="915486" y="36501"/>
+                  <a:pt x="774497" y="18288"/>
+                </a:cubicBezTo>
+                <a:cubicBezTo>
+                  <a:pt x="633508" y="75"/>
+                  <a:pt x="361442" y="-11107"/>
+                  <a:pt x="0" y="18288"/>
+                </a:cubicBezTo>
+                <a:cubicBezTo>
+                  <a:pt x="-591" y="13205"/>
+                  <a:pt x="-663" y="6329"/>
+                  <a:pt x="0" y="0"/>
+                </a:cubicBezTo>
+                <a:close/>
+              </a:path>
+              <a:path w="4480560" h="18288" stroke="0" extrusionOk="0">
+                <a:moveTo>
+                  <a:pt x="0" y="0"/>
+                </a:moveTo>
+                <a:cubicBezTo>
+                  <a:pt x="285465" y="225"/>
+                  <a:pt x="322691" y="16223"/>
+                  <a:pt x="595274" y="0"/>
+                </a:cubicBezTo>
+                <a:cubicBezTo>
+                  <a:pt x="867857" y="-16223"/>
+                  <a:pt x="989129" y="-11242"/>
+                  <a:pt x="1100938" y="0"/>
+                </a:cubicBezTo>
+                <a:cubicBezTo>
+                  <a:pt x="1212747" y="11242"/>
+                  <a:pt x="1574350" y="-36410"/>
+                  <a:pt x="1830629" y="0"/>
+                </a:cubicBezTo>
+                <a:cubicBezTo>
+                  <a:pt x="2086908" y="36410"/>
+                  <a:pt x="2180922" y="4645"/>
+                  <a:pt x="2425903" y="0"/>
+                </a:cubicBezTo>
+                <a:cubicBezTo>
+                  <a:pt x="2670884" y="-4645"/>
+                  <a:pt x="2782024" y="22929"/>
+                  <a:pt x="3021178" y="0"/>
+                </a:cubicBezTo>
+                <a:cubicBezTo>
+                  <a:pt x="3260332" y="-22929"/>
+                  <a:pt x="3456982" y="-1586"/>
+                  <a:pt x="3750869" y="0"/>
+                </a:cubicBezTo>
+                <a:cubicBezTo>
+                  <a:pt x="4044756" y="1586"/>
+                  <a:pt x="4302726" y="17043"/>
+                  <a:pt x="4480560" y="0"/>
+                </a:cubicBezTo>
+                <a:cubicBezTo>
+                  <a:pt x="4479674" y="5429"/>
+                  <a:pt x="4481381" y="14046"/>
+                  <a:pt x="4480560" y="18288"/>
+                </a:cubicBezTo>
+                <a:cubicBezTo>
+                  <a:pt x="4279652" y="-6850"/>
+                  <a:pt x="4200762" y="41566"/>
+                  <a:pt x="3930091" y="18288"/>
+                </a:cubicBezTo>
+                <a:cubicBezTo>
+                  <a:pt x="3659420" y="-4990"/>
+                  <a:pt x="3456052" y="22294"/>
+                  <a:pt x="3290011" y="18288"/>
+                </a:cubicBezTo>
+                <a:cubicBezTo>
+                  <a:pt x="3123970" y="14282"/>
+                  <a:pt x="2882392" y="32818"/>
+                  <a:pt x="2649931" y="18288"/>
+                </a:cubicBezTo>
+                <a:cubicBezTo>
+                  <a:pt x="2417470" y="3758"/>
+                  <a:pt x="2238426" y="7337"/>
+                  <a:pt x="2054657" y="18288"/>
+                </a:cubicBezTo>
+                <a:cubicBezTo>
+                  <a:pt x="1870888" y="29239"/>
+                  <a:pt x="1566368" y="45040"/>
+                  <a:pt x="1324966" y="18288"/>
+                </a:cubicBezTo>
+                <a:cubicBezTo>
+                  <a:pt x="1083564" y="-8464"/>
+                  <a:pt x="787410" y="10946"/>
+                  <a:pt x="595274" y="18288"/>
+                </a:cubicBezTo>
+                <a:cubicBezTo>
+                  <a:pt x="403138" y="25630"/>
+                  <a:pt x="169622" y="10499"/>
+                  <a:pt x="0" y="18288"/>
+                </a:cubicBezTo>
+                <a:cubicBezTo>
+                  <a:pt x="668" y="13665"/>
+                  <a:pt x="578" y="5675"/>
+                  <a:pt x="0" y="0"/>
+                </a:cubicBezTo>
+                <a:close/>
+              </a:path>
+            </a:pathLst>
+          </a:custGeom>
+          <a:solidFill>
+            <a:schemeClr val="accent2"/>
+          </a:solidFill>
+          <a:ln w="41275" cap="rnd">
+            <a:solidFill>
+              <a:schemeClr val="accent2"/>
+            </a:solidFill>
+            <a:round/>
+            <a:extLst>
+              <a:ext uri="{C807C97D-BFC1-408E-A445-0C87EB9F89A2}">
+                <ask:lineSketchStyleProps xmlns:ask="http://schemas.microsoft.com/office/drawing/2018/sketchyshapes" sd="1219033472">
+                  <a:prstGeom prst="rect">
+                    <a:avLst/>
+                  </a:prstGeom>
+                  <ask:type>
+                    <ask:lineSketchFreehand/>
+                  </ask:type>
+                </ask:lineSketchStyleProps>
+              </a:ext>
+            </a:extLst>
+          </a:ln>
+        </p:spPr>
+        <p:style>
+          <a:lnRef idx="2">
+            <a:schemeClr val="accent1">
+              <a:shade val="50000"/>
+            </a:schemeClr>
+          </a:lnRef>
+          <a:fillRef idx="1">
+            <a:schemeClr val="accent1"/>
+          </a:fillRef>
+          <a:effectRef idx="0">
+            <a:schemeClr val="accent1"/>
+          </a:effectRef>
+          <a:fontRef idx="minor">
+            <a:schemeClr val="lt1"/>
+          </a:fontRef>
+        </p:style>
+        <p:txBody>
+          <a:bodyPr rtlCol="0" anchor="ctr"/>
+          <a:lstStyle/>
+          <a:p>
+            <a:pPr algn="ctr"/>
+            <a:endParaRPr lang="en-US"/>
+          </a:p>
+        </p:txBody>
+      </p:sp>
+      <p:sp>
+        <p:nvSpPr>
+          <p:cNvPr id="3" name="Content Placeholder 2"/>
+          <p:cNvSpPr>
+            <a:spLocks noGrp="1"/>
+          </p:cNvSpPr>
+          <p:nvPr>
+            <p:ph idx="1"/>
+          </p:nvPr>
+        </p:nvSpPr>
+        <p:spPr>
+          <a:xfrm>
+            <a:off x="5126418" y="552091"/>
+            <a:ext cx="6224335" cy="5431536"/>
+          </a:xfrm>
+        </p:spPr>
+        <p:txBody>
+          <a:bodyPr anchor="ctr">
+            <a:normAutofit/>
+          </a:bodyPr>
+          <a:lstStyle/>
+          <a:p>
+            <a:pPr marL="201168" lvl="1" indent="0" fontAlgn="base">
+              <a:buNone/>
+            </a:pPr>
+            <a:r>
+              <a:rPr lang="en-US" sz="2200" dirty="0">
+                <a:hlinkClick r:id="rId3"/>
+              </a:rPr>
+              <a:t>https://github.com/praveenraghuvanshi/tech-sessions/tree/master/14042022-Practical-ML-Net-Sound-Classification</a:t>
+            </a:r>
+            <a:endParaRPr lang="en-US" sz="2200" dirty="0"/>
+          </a:p>
+        </p:txBody>
+      </p:sp>
+      <p:sp>
+        <p:nvSpPr>
+          <p:cNvPr id="5" name="Footer Placeholder 3"/>
+          <p:cNvSpPr>
+            <a:spLocks noGrp="1"/>
+          </p:cNvSpPr>
+          <p:nvPr>
+            <p:ph type="ftr" sz="quarter" idx="11"/>
+          </p:nvPr>
+        </p:nvSpPr>
+        <p:spPr>
+          <a:xfrm>
+            <a:off x="4038600" y="6356350"/>
+            <a:ext cx="4114800" cy="365125"/>
+          </a:xfrm>
+        </p:spPr>
+        <p:txBody>
+          <a:bodyPr>
+            <a:normAutofit/>
+          </a:bodyPr>
+          <a:lstStyle/>
+          <a:p>
+            <a:pPr>
+              <a:spcAft>
+                <a:spcPts val="600"/>
+              </a:spcAft>
+            </a:pPr>
+            <a:r>
+              <a:rPr lang="en-US"/>
+              <a:t>@</a:t>
+            </a:r>
+            <a:r>
+              <a:rPr lang="en-US" err="1"/>
+              <a:t>praveenraghuvan</a:t>
+            </a:r>
+            <a:endParaRPr lang="en-US"/>
+          </a:p>
+        </p:txBody>
+      </p:sp>
+      <p:pic>
+        <p:nvPicPr>
+          <p:cNvPr id="4" name="Picture 3">
+            <a:extLst>
+              <a:ext uri="{FF2B5EF4-FFF2-40B4-BE49-F238E27FC236}">
+                <a16:creationId xmlns:a16="http://schemas.microsoft.com/office/drawing/2014/main" id="{4C0B1ADE-2E39-9F68-E8E2-43020170F708}"/>
+              </a:ext>
+            </a:extLst>
+          </p:cNvPr>
+          <p:cNvPicPr>
+            <a:picLocks noChangeAspect="1"/>
+          </p:cNvPicPr>
+          <p:nvPr/>
+        </p:nvPicPr>
+        <p:blipFill>
+          <a:blip r:embed="rId4"/>
+          <a:stretch>
+            <a:fillRect/>
+          </a:stretch>
+        </p:blipFill>
+        <p:spPr>
+          <a:xfrm>
+            <a:off x="10561314" y="33090"/>
+            <a:ext cx="1630685" cy="365125"/>
+          </a:xfrm>
+          <a:prstGeom prst="rect">
+            <a:avLst/>
+          </a:prstGeom>
+        </p:spPr>
+      </p:pic>
+      <p:pic>
+        <p:nvPicPr>
+          <p:cNvPr id="6" name="Picture 5">
+            <a:extLst>
+              <a:ext uri="{FF2B5EF4-FFF2-40B4-BE49-F238E27FC236}">
+                <a16:creationId xmlns:a16="http://schemas.microsoft.com/office/drawing/2014/main" id="{93875B6E-372D-59C9-5B92-555744F092E9}"/>
+              </a:ext>
+            </a:extLst>
+          </p:cNvPr>
+          <p:cNvPicPr>
+            <a:picLocks noChangeAspect="1"/>
+          </p:cNvPicPr>
+          <p:nvPr/>
+        </p:nvPicPr>
+        <p:blipFill>
+          <a:blip r:embed="rId5"/>
+          <a:stretch>
+            <a:fillRect/>
+          </a:stretch>
+        </p:blipFill>
+        <p:spPr>
+          <a:xfrm>
+            <a:off x="7791654" y="2199045"/>
+            <a:ext cx="523875" cy="533400"/>
+          </a:xfrm>
+          <a:prstGeom prst="rect">
+            <a:avLst/>
+          </a:prstGeom>
+        </p:spPr>
+      </p:pic>
+    </p:spTree>
+    <p:extLst>
+      <p:ext uri="{BB962C8B-B14F-4D97-AF65-F5344CB8AC3E}">
+        <p14:creationId xmlns:p14="http://schemas.microsoft.com/office/powerpoint/2010/main" val="1550265034"/>
       </p:ext>
     </p:extLst>
   </p:cSld>

</xml_diff>

<commit_message>
DotNet Bangalore May 2024: Sound Classification using ML.Net Updated Jupyter notebook and ppt
</commit_message>
<xml_diff>
--- a/11052024-Sound-Classification-ML.Net-dotnetblr/SoundClassification-dotnetblr.pptx
+++ b/11052024-Sound-Classification-ML.Net-dotnetblr/SoundClassification-dotnetblr.pptx
@@ -8728,6 +8728,41 @@
           </a:xfrm>
         </p:spPr>
       </p:pic>
+      <p:sp>
+        <p:nvSpPr>
+          <p:cNvPr id="6" name="TextBox 5">
+            <a:extLst>
+              <a:ext uri="{FF2B5EF4-FFF2-40B4-BE49-F238E27FC236}">
+                <a16:creationId xmlns:a16="http://schemas.microsoft.com/office/drawing/2014/main" id="{622936CD-4356-D212-F497-64792DECA4B4}"/>
+              </a:ext>
+            </a:extLst>
+          </p:cNvPr>
+          <p:cNvSpPr txBox="1"/>
+          <p:nvPr/>
+        </p:nvSpPr>
+        <p:spPr>
+          <a:xfrm>
+            <a:off x="3140652" y="6354246"/>
+            <a:ext cx="6094268" cy="369332"/>
+          </a:xfrm>
+          <a:prstGeom prst="rect">
+            <a:avLst/>
+          </a:prstGeom>
+          <a:noFill/>
+        </p:spPr>
+        <p:txBody>
+          <a:bodyPr wrap="square">
+            <a:spAutoFit/>
+          </a:bodyPr>
+          <a:lstStyle/>
+          <a:p>
+            <a:r>
+              <a:rPr lang="en-US" dirty="0"/>
+              <a:t>https://musiclab.chromeexperiments.com/spectrogram</a:t>
+            </a:r>
+          </a:p>
+        </p:txBody>
+      </p:sp>
     </p:spTree>
     <p:extLst>
       <p:ext uri="{BB962C8B-B14F-4D97-AF65-F5344CB8AC3E}">

</xml_diff>